<commit_message>
Added new segmentation demo for no egress network, but it did not
</commit_message>
<xml_diff>
--- a/software defined infrastructure/20181013 Software Defined Infrastructure.pptx
+++ b/software defined infrastructure/20181013 Software Defined Infrastructure.pptx
@@ -5,7 +5,7 @@
     <p:sldMasterId id="2147483673" r:id="rId1"/>
   </p:sldMasterIdLst>
   <p:handoutMasterIdLst>
-    <p:handoutMasterId r:id="rId22"/>
+    <p:handoutMasterId r:id="rId23"/>
   </p:handoutMasterIdLst>
   <p:sldIdLst>
     <p:sldId id="259" r:id="rId2"/>
@@ -28,6 +28,7 @@
     <p:sldId id="315" r:id="rId19"/>
     <p:sldId id="273" r:id="rId20"/>
     <p:sldId id="260" r:id="rId21"/>
+    <p:sldId id="376" r:id="rId22"/>
   </p:sldIdLst>
   <p:sldSz cx="12192000" cy="6858000"/>
   <p:notesSz cx="6858000" cy="9144000"/>
@@ -160,10 +161,6 @@
 </p:cmAuthorLst>
 </file>
 
-<file path=ppt/revisionInfo.xml><?xml version="1.0" encoding="utf-8"?>
-<p1510:revInfo xmlns:a="http://schemas.openxmlformats.org/drawingml/2006/main" xmlns:r="http://schemas.openxmlformats.org/officeDocument/2006/relationships" xmlns:p1510="http://schemas.microsoft.com/office/powerpoint/2015/10/main"/>
-</file>
-
 <file path=ppt/comments/comment1.xml><?xml version="1.0" encoding="utf-8"?>
 <p:cmLst xmlns:a="http://schemas.openxmlformats.org/drawingml/2006/main" xmlns:r="http://schemas.openxmlformats.org/officeDocument/2006/relationships" xmlns:p="http://schemas.openxmlformats.org/presentationml/2006/main">
   <p:cm authorId="1" dt="2018-10-24T10:43:39.871" idx="1">
@@ -272,7 +269,7 @@
           <a:p>
             <a:fld id="{F030F62F-3AA1-4F84-B977-74CB3EA0049D}" type="datetimeFigureOut">
               <a:rPr lang="en-US" smtClean="0"/>
-              <a:t>10/26/2018</a:t>
+              <a:t>10/28/2018</a:t>
             </a:fld>
             <a:endParaRPr lang="en-US"/>
           </a:p>
@@ -3483,7 +3480,7 @@
           <a:p>
             <a:fld id="{C764DE79-268F-4C1A-8933-263129D2AF90}" type="datetimeFigureOut">
               <a:rPr lang="en-US" dirty="0"/>
-              <a:t>10/26/2018</a:t>
+              <a:t>10/28/2018</a:t>
             </a:fld>
             <a:endParaRPr lang="en-US" dirty="0"/>
           </a:p>
@@ -11478,7 +11475,7 @@
                 <a16:creationId xmlns:a16="http://schemas.microsoft.com/office/drawing/2014/main" id="{5B32A67F-3598-4A13-8552-DA884FFCCE57}"/>
               </a:ext>
               <a:ext uri="{C183D7F6-B498-43B3-948B-1728B52AA6E4}">
-                <adec:decorative xmlns="" xmlns:adec="http://schemas.microsoft.com/office/drawing/2017/decorative" val="1"/>
+                <adec:decorative xmlns:adec="http://schemas.microsoft.com/office/drawing/2017/decorative" val="1"/>
               </a:ext>
             </a:extLst>
           </p:cNvPr>
@@ -11615,7 +11612,7 @@
                 <a16:creationId xmlns:a16="http://schemas.microsoft.com/office/drawing/2014/main" id="{BCC55ACC-A2F6-403C-A3A4-D59B3734D45F}"/>
               </a:ext>
               <a:ext uri="{C183D7F6-B498-43B3-948B-1728B52AA6E4}">
-                <adec:decorative xmlns="" xmlns:adec="http://schemas.microsoft.com/office/drawing/2017/decorative" val="1"/>
+                <adec:decorative xmlns:adec="http://schemas.microsoft.com/office/drawing/2017/decorative" val="1"/>
               </a:ext>
             </a:extLst>
           </p:cNvPr>
@@ -11816,7 +11813,7 @@
                 <a16:creationId xmlns:a16="http://schemas.microsoft.com/office/drawing/2014/main" id="{598EBA13-C937-430B-9523-439FE21096E6}"/>
               </a:ext>
               <a:ext uri="{C183D7F6-B498-43B3-948B-1728B52AA6E4}">
-                <adec:decorative xmlns="" xmlns:adec="http://schemas.microsoft.com/office/drawing/2017/decorative" val="1"/>
+                <adec:decorative xmlns:adec="http://schemas.microsoft.com/office/drawing/2017/decorative" val="1"/>
               </a:ext>
             </a:extLst>
           </p:cNvPr>
@@ -12299,6 +12296,956 @@
 </p:sld>
 </file>
 
+<file path=ppt/slides/slide21.xml><?xml version="1.0" encoding="utf-8"?>
+<p:sld xmlns:a="http://schemas.openxmlformats.org/drawingml/2006/main" xmlns:r="http://schemas.openxmlformats.org/officeDocument/2006/relationships" xmlns:p="http://schemas.openxmlformats.org/presentationml/2006/main">
+  <p:cSld>
+    <p:spTree>
+      <p:nvGrpSpPr>
+        <p:cNvPr id="1" name=""/>
+        <p:cNvGrpSpPr/>
+        <p:nvPr/>
+      </p:nvGrpSpPr>
+      <p:grpSpPr>
+        <a:xfrm>
+          <a:off x="0" y="0"/>
+          <a:ext cx="0" cy="0"/>
+          <a:chOff x="0" y="0"/>
+          <a:chExt cx="0" cy="0"/>
+        </a:xfrm>
+      </p:grpSpPr>
+      <p:sp>
+        <p:nvSpPr>
+          <p:cNvPr id="2" name="Title 1">
+            <a:extLst>
+              <a:ext uri="{FF2B5EF4-FFF2-40B4-BE49-F238E27FC236}">
+                <a16:creationId xmlns:a16="http://schemas.microsoft.com/office/drawing/2014/main" id="{86D8D129-46CD-4792-935C-06473A924EC8}"/>
+              </a:ext>
+            </a:extLst>
+          </p:cNvPr>
+          <p:cNvSpPr>
+            <a:spLocks noGrp="1"/>
+          </p:cNvSpPr>
+          <p:nvPr>
+            <p:ph type="title"/>
+          </p:nvPr>
+        </p:nvSpPr>
+        <p:spPr>
+          <a:xfrm>
+            <a:off x="479427" y="-118940"/>
+            <a:ext cx="10515600" cy="1325563"/>
+          </a:xfrm>
+        </p:spPr>
+        <p:txBody>
+          <a:bodyPr/>
+          <a:lstStyle/>
+          <a:p>
+            <a:r>
+              <a:rPr lang="en-US" dirty="0"/>
+              <a:t>SDI – Seg6</a:t>
+            </a:r>
+          </a:p>
+        </p:txBody>
+      </p:sp>
+      <p:sp>
+        <p:nvSpPr>
+          <p:cNvPr id="6" name="Flowchart: Process 5">
+            <a:extLst>
+              <a:ext uri="{FF2B5EF4-FFF2-40B4-BE49-F238E27FC236}">
+                <a16:creationId xmlns:a16="http://schemas.microsoft.com/office/drawing/2014/main" id="{24CFFBC8-9D0A-4F5E-ADF8-4B0D21A60D6E}"/>
+              </a:ext>
+            </a:extLst>
+          </p:cNvPr>
+          <p:cNvSpPr/>
+          <p:nvPr/>
+        </p:nvSpPr>
+        <p:spPr>
+          <a:xfrm>
+            <a:off x="1290415" y="1623698"/>
+            <a:ext cx="4495088" cy="119641"/>
+          </a:xfrm>
+          <a:prstGeom prst="flowChartProcess">
+            <a:avLst/>
+          </a:prstGeom>
+        </p:spPr>
+        <p:style>
+          <a:lnRef idx="2">
+            <a:schemeClr val="accent1">
+              <a:shade val="50000"/>
+            </a:schemeClr>
+          </a:lnRef>
+          <a:fillRef idx="1">
+            <a:schemeClr val="accent1"/>
+          </a:fillRef>
+          <a:effectRef idx="0">
+            <a:schemeClr val="accent1"/>
+          </a:effectRef>
+          <a:fontRef idx="minor">
+            <a:schemeClr val="lt1"/>
+          </a:fontRef>
+        </p:style>
+        <p:txBody>
+          <a:bodyPr rtlCol="0" anchor="ctr"/>
+          <a:lstStyle/>
+          <a:p>
+            <a:pPr algn="ctr"/>
+            <a:endParaRPr lang="en-US"/>
+          </a:p>
+        </p:txBody>
+      </p:sp>
+      <p:sp>
+        <p:nvSpPr>
+          <p:cNvPr id="7" name="Flowchart: Process 6">
+            <a:extLst>
+              <a:ext uri="{FF2B5EF4-FFF2-40B4-BE49-F238E27FC236}">
+                <a16:creationId xmlns:a16="http://schemas.microsoft.com/office/drawing/2014/main" id="{A78E0ED0-6F44-478E-96E6-FA7EF21EC626}"/>
+              </a:ext>
+            </a:extLst>
+          </p:cNvPr>
+          <p:cNvSpPr/>
+          <p:nvPr/>
+        </p:nvSpPr>
+        <p:spPr>
+          <a:xfrm rot="5400000">
+            <a:off x="1802451" y="1930634"/>
+            <a:ext cx="494231" cy="119641"/>
+          </a:xfrm>
+          <a:prstGeom prst="flowChartProcess">
+            <a:avLst/>
+          </a:prstGeom>
+        </p:spPr>
+        <p:style>
+          <a:lnRef idx="2">
+            <a:schemeClr val="accent1">
+              <a:shade val="50000"/>
+            </a:schemeClr>
+          </a:lnRef>
+          <a:fillRef idx="1">
+            <a:schemeClr val="accent1"/>
+          </a:fillRef>
+          <a:effectRef idx="0">
+            <a:schemeClr val="accent1"/>
+          </a:effectRef>
+          <a:fontRef idx="minor">
+            <a:schemeClr val="lt1"/>
+          </a:fontRef>
+        </p:style>
+        <p:txBody>
+          <a:bodyPr rtlCol="0" anchor="ctr"/>
+          <a:lstStyle/>
+          <a:p>
+            <a:pPr algn="ctr"/>
+            <a:endParaRPr lang="en-US"/>
+          </a:p>
+        </p:txBody>
+      </p:sp>
+      <p:sp>
+        <p:nvSpPr>
+          <p:cNvPr id="8" name="Flowchart: Process 7">
+            <a:extLst>
+              <a:ext uri="{FF2B5EF4-FFF2-40B4-BE49-F238E27FC236}">
+                <a16:creationId xmlns:a16="http://schemas.microsoft.com/office/drawing/2014/main" id="{2D292A60-6DC1-4721-A2FD-834730F292A2}"/>
+              </a:ext>
+            </a:extLst>
+          </p:cNvPr>
+          <p:cNvSpPr/>
+          <p:nvPr/>
+        </p:nvSpPr>
+        <p:spPr>
+          <a:xfrm rot="5400000">
+            <a:off x="4898878" y="1938467"/>
+            <a:ext cx="494231" cy="119641"/>
+          </a:xfrm>
+          <a:prstGeom prst="flowChartProcess">
+            <a:avLst/>
+          </a:prstGeom>
+        </p:spPr>
+        <p:style>
+          <a:lnRef idx="2">
+            <a:schemeClr val="accent1">
+              <a:shade val="50000"/>
+            </a:schemeClr>
+          </a:lnRef>
+          <a:fillRef idx="1">
+            <a:schemeClr val="accent1"/>
+          </a:fillRef>
+          <a:effectRef idx="0">
+            <a:schemeClr val="accent1"/>
+          </a:effectRef>
+          <a:fontRef idx="minor">
+            <a:schemeClr val="lt1"/>
+          </a:fontRef>
+        </p:style>
+        <p:txBody>
+          <a:bodyPr rtlCol="0" anchor="ctr"/>
+          <a:lstStyle/>
+          <a:p>
+            <a:pPr algn="ctr"/>
+            <a:endParaRPr lang="en-US"/>
+          </a:p>
+        </p:txBody>
+      </p:sp>
+      <p:sp>
+        <p:nvSpPr>
+          <p:cNvPr id="9" name="Flowchart: Process 8">
+            <a:extLst>
+              <a:ext uri="{FF2B5EF4-FFF2-40B4-BE49-F238E27FC236}">
+                <a16:creationId xmlns:a16="http://schemas.microsoft.com/office/drawing/2014/main" id="{A3A5EEB4-711C-479B-BF3A-BD914A0241B0}"/>
+              </a:ext>
+            </a:extLst>
+          </p:cNvPr>
+          <p:cNvSpPr/>
+          <p:nvPr/>
+        </p:nvSpPr>
+        <p:spPr>
+          <a:xfrm rot="5400000">
+            <a:off x="3350664" y="1930634"/>
+            <a:ext cx="494231" cy="119641"/>
+          </a:xfrm>
+          <a:prstGeom prst="flowChartProcess">
+            <a:avLst/>
+          </a:prstGeom>
+        </p:spPr>
+        <p:style>
+          <a:lnRef idx="2">
+            <a:schemeClr val="accent1">
+              <a:shade val="50000"/>
+            </a:schemeClr>
+          </a:lnRef>
+          <a:fillRef idx="1">
+            <a:schemeClr val="accent1"/>
+          </a:fillRef>
+          <a:effectRef idx="0">
+            <a:schemeClr val="accent1"/>
+          </a:effectRef>
+          <a:fontRef idx="minor">
+            <a:schemeClr val="lt1"/>
+          </a:fontRef>
+        </p:style>
+        <p:txBody>
+          <a:bodyPr rtlCol="0" anchor="ctr"/>
+          <a:lstStyle/>
+          <a:p>
+            <a:pPr algn="ctr"/>
+            <a:endParaRPr lang="en-US"/>
+          </a:p>
+        </p:txBody>
+      </p:sp>
+      <p:sp>
+        <p:nvSpPr>
+          <p:cNvPr id="10" name="Flowchart: Process 9">
+            <a:extLst>
+              <a:ext uri="{FF2B5EF4-FFF2-40B4-BE49-F238E27FC236}">
+                <a16:creationId xmlns:a16="http://schemas.microsoft.com/office/drawing/2014/main" id="{70B09B71-C4E7-4930-AE78-4FBD299EE11E}"/>
+              </a:ext>
+            </a:extLst>
+          </p:cNvPr>
+          <p:cNvSpPr/>
+          <p:nvPr/>
+        </p:nvSpPr>
+        <p:spPr>
+          <a:xfrm>
+            <a:off x="1464179" y="2245403"/>
+            <a:ext cx="1170774" cy="1051132"/>
+          </a:xfrm>
+          <a:prstGeom prst="flowChartProcess">
+            <a:avLst/>
+          </a:prstGeom>
+        </p:spPr>
+        <p:style>
+          <a:lnRef idx="2">
+            <a:schemeClr val="accent1">
+              <a:shade val="50000"/>
+            </a:schemeClr>
+          </a:lnRef>
+          <a:fillRef idx="1">
+            <a:schemeClr val="accent1"/>
+          </a:fillRef>
+          <a:effectRef idx="0">
+            <a:schemeClr val="accent1"/>
+          </a:effectRef>
+          <a:fontRef idx="minor">
+            <a:schemeClr val="lt1"/>
+          </a:fontRef>
+        </p:style>
+        <p:txBody>
+          <a:bodyPr rtlCol="0" anchor="ctr"/>
+          <a:lstStyle/>
+          <a:p>
+            <a:pPr algn="ctr"/>
+            <a:r>
+              <a:rPr lang="en-US" dirty="0"/>
+              <a:t>frontend1</a:t>
+            </a:r>
+          </a:p>
+        </p:txBody>
+      </p:sp>
+      <p:sp>
+        <p:nvSpPr>
+          <p:cNvPr id="11" name="Flowchart: Process 10">
+            <a:extLst>
+              <a:ext uri="{FF2B5EF4-FFF2-40B4-BE49-F238E27FC236}">
+                <a16:creationId xmlns:a16="http://schemas.microsoft.com/office/drawing/2014/main" id="{83EE6A72-156F-4722-9F5D-53D778B9F867}"/>
+              </a:ext>
+            </a:extLst>
+          </p:cNvPr>
+          <p:cNvSpPr/>
+          <p:nvPr/>
+        </p:nvSpPr>
+        <p:spPr>
+          <a:xfrm>
+            <a:off x="3012393" y="2245403"/>
+            <a:ext cx="1170774" cy="1051132"/>
+          </a:xfrm>
+          <a:prstGeom prst="flowChartProcess">
+            <a:avLst/>
+          </a:prstGeom>
+        </p:spPr>
+        <p:style>
+          <a:lnRef idx="2">
+            <a:schemeClr val="accent1">
+              <a:shade val="50000"/>
+            </a:schemeClr>
+          </a:lnRef>
+          <a:fillRef idx="1">
+            <a:schemeClr val="accent1"/>
+          </a:fillRef>
+          <a:effectRef idx="0">
+            <a:schemeClr val="accent1"/>
+          </a:effectRef>
+          <a:fontRef idx="minor">
+            <a:schemeClr val="lt1"/>
+          </a:fontRef>
+        </p:style>
+        <p:txBody>
+          <a:bodyPr rtlCol="0" anchor="ctr"/>
+          <a:lstStyle/>
+          <a:p>
+            <a:pPr algn="ctr"/>
+            <a:r>
+              <a:rPr lang="en-US" dirty="0"/>
+              <a:t>middle1</a:t>
+            </a:r>
+          </a:p>
+        </p:txBody>
+      </p:sp>
+      <p:sp>
+        <p:nvSpPr>
+          <p:cNvPr id="12" name="Flowchart: Process 11">
+            <a:extLst>
+              <a:ext uri="{FF2B5EF4-FFF2-40B4-BE49-F238E27FC236}">
+                <a16:creationId xmlns:a16="http://schemas.microsoft.com/office/drawing/2014/main" id="{1D33C37B-FB07-4356-A618-7E5C0DD6467E}"/>
+              </a:ext>
+            </a:extLst>
+          </p:cNvPr>
+          <p:cNvSpPr/>
+          <p:nvPr/>
+        </p:nvSpPr>
+        <p:spPr>
+          <a:xfrm>
+            <a:off x="4560605" y="2253236"/>
+            <a:ext cx="1170774" cy="1051132"/>
+          </a:xfrm>
+          <a:prstGeom prst="flowChartProcess">
+            <a:avLst/>
+          </a:prstGeom>
+        </p:spPr>
+        <p:style>
+          <a:lnRef idx="2">
+            <a:schemeClr val="accent1">
+              <a:shade val="50000"/>
+            </a:schemeClr>
+          </a:lnRef>
+          <a:fillRef idx="1">
+            <a:schemeClr val="accent1"/>
+          </a:fillRef>
+          <a:effectRef idx="0">
+            <a:schemeClr val="accent1"/>
+          </a:effectRef>
+          <a:fontRef idx="minor">
+            <a:schemeClr val="lt1"/>
+          </a:fontRef>
+        </p:style>
+        <p:txBody>
+          <a:bodyPr rtlCol="0" anchor="ctr"/>
+          <a:lstStyle/>
+          <a:p>
+            <a:pPr algn="ctr"/>
+            <a:r>
+              <a:rPr lang="en-US" dirty="0"/>
+              <a:t>backend1</a:t>
+            </a:r>
+          </a:p>
+        </p:txBody>
+      </p:sp>
+      <p:sp>
+        <p:nvSpPr>
+          <p:cNvPr id="13" name="TextBox 12">
+            <a:extLst>
+              <a:ext uri="{FF2B5EF4-FFF2-40B4-BE49-F238E27FC236}">
+                <a16:creationId xmlns:a16="http://schemas.microsoft.com/office/drawing/2014/main" id="{7E7794FC-16AD-4DD1-B075-B2C6F48F1B35}"/>
+              </a:ext>
+            </a:extLst>
+          </p:cNvPr>
+          <p:cNvSpPr txBox="1"/>
+          <p:nvPr/>
+        </p:nvSpPr>
+        <p:spPr>
+          <a:xfrm>
+            <a:off x="1464179" y="1238424"/>
+            <a:ext cx="2005412" cy="369332"/>
+          </a:xfrm>
+          <a:prstGeom prst="rect">
+            <a:avLst/>
+          </a:prstGeom>
+          <a:noFill/>
+        </p:spPr>
+        <p:txBody>
+          <a:bodyPr wrap="square" rtlCol="0">
+            <a:spAutoFit/>
+          </a:bodyPr>
+          <a:lstStyle/>
+          <a:p>
+            <a:r>
+              <a:rPr lang="en-US" dirty="0"/>
+              <a:t>group1_net</a:t>
+            </a:r>
+          </a:p>
+        </p:txBody>
+      </p:sp>
+      <p:sp>
+        <p:nvSpPr>
+          <p:cNvPr id="14" name="Content Placeholder 2">
+            <a:extLst>
+              <a:ext uri="{FF2B5EF4-FFF2-40B4-BE49-F238E27FC236}">
+                <a16:creationId xmlns:a16="http://schemas.microsoft.com/office/drawing/2014/main" id="{A7989A54-EA6A-435D-9586-76128885BE19}"/>
+              </a:ext>
+            </a:extLst>
+          </p:cNvPr>
+          <p:cNvSpPr>
+            <a:spLocks noGrp="1"/>
+          </p:cNvSpPr>
+          <p:nvPr>
+            <p:ph sz="half" idx="10"/>
+          </p:nvPr>
+        </p:nvSpPr>
+        <p:spPr>
+          <a:xfrm>
+            <a:off x="1290415" y="4016523"/>
+            <a:ext cx="8651194" cy="1993669"/>
+          </a:xfrm>
+        </p:spPr>
+        <p:txBody>
+          <a:bodyPr>
+            <a:normAutofit fontScale="92500" lnSpcReduction="20000"/>
+          </a:bodyPr>
+          <a:lstStyle/>
+          <a:p>
+            <a:r>
+              <a:rPr lang="en-US" dirty="0"/>
+              <a:t>Two networks</a:t>
+            </a:r>
+          </a:p>
+          <a:p>
+            <a:pPr lvl="1"/>
+            <a:r>
+              <a:rPr lang="en-US" dirty="0"/>
+              <a:t>Called group1_net, group2_net</a:t>
+            </a:r>
+          </a:p>
+          <a:p>
+            <a:pPr lvl="1"/>
+            <a:r>
+              <a:rPr lang="en-US" dirty="0"/>
+              <a:t>Each running 3 services with a single container in each service</a:t>
+            </a:r>
+          </a:p>
+          <a:p>
+            <a:r>
+              <a:rPr lang="en-US" dirty="0"/>
+              <a:t>Demonstrate</a:t>
+            </a:r>
+          </a:p>
+          <a:p>
+            <a:pPr lvl="1"/>
+            <a:r>
+              <a:rPr lang="en-US" dirty="0"/>
+              <a:t>Group1_net has egress access</a:t>
+            </a:r>
+          </a:p>
+          <a:p>
+            <a:pPr lvl="1"/>
+            <a:r>
+              <a:rPr lang="en-US" dirty="0"/>
+              <a:t>Group2_net does not have egress</a:t>
+            </a:r>
+          </a:p>
+          <a:p>
+            <a:pPr lvl="1"/>
+            <a:endParaRPr lang="en-US" dirty="0"/>
+          </a:p>
+          <a:p>
+            <a:endParaRPr lang="en-US" dirty="0"/>
+          </a:p>
+          <a:p>
+            <a:endParaRPr lang="en-US" dirty="0"/>
+          </a:p>
+        </p:txBody>
+      </p:sp>
+      <p:sp>
+        <p:nvSpPr>
+          <p:cNvPr id="15" name="Flowchart: Process 14">
+            <a:extLst>
+              <a:ext uri="{FF2B5EF4-FFF2-40B4-BE49-F238E27FC236}">
+                <a16:creationId xmlns:a16="http://schemas.microsoft.com/office/drawing/2014/main" id="{589F8A9F-891C-4FBC-9175-A19E61AAF1E2}"/>
+              </a:ext>
+            </a:extLst>
+          </p:cNvPr>
+          <p:cNvSpPr/>
+          <p:nvPr/>
+        </p:nvSpPr>
+        <p:spPr>
+          <a:xfrm>
+            <a:off x="6671419" y="1623698"/>
+            <a:ext cx="4495088" cy="119641"/>
+          </a:xfrm>
+          <a:prstGeom prst="flowChartProcess">
+            <a:avLst/>
+          </a:prstGeom>
+        </p:spPr>
+        <p:style>
+          <a:lnRef idx="2">
+            <a:schemeClr val="accent6">
+              <a:shade val="50000"/>
+            </a:schemeClr>
+          </a:lnRef>
+          <a:fillRef idx="1">
+            <a:schemeClr val="accent6"/>
+          </a:fillRef>
+          <a:effectRef idx="0">
+            <a:schemeClr val="accent6"/>
+          </a:effectRef>
+          <a:fontRef idx="minor">
+            <a:schemeClr val="lt1"/>
+          </a:fontRef>
+        </p:style>
+        <p:txBody>
+          <a:bodyPr rtlCol="0" anchor="ctr"/>
+          <a:lstStyle/>
+          <a:p>
+            <a:pPr algn="ctr"/>
+            <a:endParaRPr lang="en-US"/>
+          </a:p>
+        </p:txBody>
+      </p:sp>
+      <p:sp>
+        <p:nvSpPr>
+          <p:cNvPr id="16" name="Flowchart: Process 15">
+            <a:extLst>
+              <a:ext uri="{FF2B5EF4-FFF2-40B4-BE49-F238E27FC236}">
+                <a16:creationId xmlns:a16="http://schemas.microsoft.com/office/drawing/2014/main" id="{CDE19A22-4F64-4542-881B-D7727CFE7AEF}"/>
+              </a:ext>
+            </a:extLst>
+          </p:cNvPr>
+          <p:cNvSpPr/>
+          <p:nvPr/>
+        </p:nvSpPr>
+        <p:spPr>
+          <a:xfrm rot="5400000">
+            <a:off x="7183455" y="1930634"/>
+            <a:ext cx="494231" cy="119641"/>
+          </a:xfrm>
+          <a:prstGeom prst="flowChartProcess">
+            <a:avLst/>
+          </a:prstGeom>
+        </p:spPr>
+        <p:style>
+          <a:lnRef idx="2">
+            <a:schemeClr val="accent6">
+              <a:shade val="50000"/>
+            </a:schemeClr>
+          </a:lnRef>
+          <a:fillRef idx="1">
+            <a:schemeClr val="accent6"/>
+          </a:fillRef>
+          <a:effectRef idx="0">
+            <a:schemeClr val="accent6"/>
+          </a:effectRef>
+          <a:fontRef idx="minor">
+            <a:schemeClr val="lt1"/>
+          </a:fontRef>
+        </p:style>
+        <p:txBody>
+          <a:bodyPr rtlCol="0" anchor="ctr"/>
+          <a:lstStyle/>
+          <a:p>
+            <a:pPr algn="ctr"/>
+            <a:endParaRPr lang="en-US"/>
+          </a:p>
+        </p:txBody>
+      </p:sp>
+      <p:sp>
+        <p:nvSpPr>
+          <p:cNvPr id="17" name="Flowchart: Process 16">
+            <a:extLst>
+              <a:ext uri="{FF2B5EF4-FFF2-40B4-BE49-F238E27FC236}">
+                <a16:creationId xmlns:a16="http://schemas.microsoft.com/office/drawing/2014/main" id="{EA42BBB3-FEB1-4685-8F3F-603CAE943081}"/>
+              </a:ext>
+            </a:extLst>
+          </p:cNvPr>
+          <p:cNvSpPr/>
+          <p:nvPr/>
+        </p:nvSpPr>
+        <p:spPr>
+          <a:xfrm rot="5400000">
+            <a:off x="10279882" y="1938467"/>
+            <a:ext cx="494231" cy="119641"/>
+          </a:xfrm>
+          <a:prstGeom prst="flowChartProcess">
+            <a:avLst/>
+          </a:prstGeom>
+        </p:spPr>
+        <p:style>
+          <a:lnRef idx="2">
+            <a:schemeClr val="accent6">
+              <a:shade val="50000"/>
+            </a:schemeClr>
+          </a:lnRef>
+          <a:fillRef idx="1">
+            <a:schemeClr val="accent6"/>
+          </a:fillRef>
+          <a:effectRef idx="0">
+            <a:schemeClr val="accent6"/>
+          </a:effectRef>
+          <a:fontRef idx="minor">
+            <a:schemeClr val="lt1"/>
+          </a:fontRef>
+        </p:style>
+        <p:txBody>
+          <a:bodyPr rtlCol="0" anchor="ctr"/>
+          <a:lstStyle/>
+          <a:p>
+            <a:pPr algn="ctr"/>
+            <a:endParaRPr lang="en-US"/>
+          </a:p>
+        </p:txBody>
+      </p:sp>
+      <p:sp>
+        <p:nvSpPr>
+          <p:cNvPr id="18" name="Flowchart: Process 17">
+            <a:extLst>
+              <a:ext uri="{FF2B5EF4-FFF2-40B4-BE49-F238E27FC236}">
+                <a16:creationId xmlns:a16="http://schemas.microsoft.com/office/drawing/2014/main" id="{CB7EE25C-00E9-4F60-B92A-699B6A079889}"/>
+              </a:ext>
+            </a:extLst>
+          </p:cNvPr>
+          <p:cNvSpPr/>
+          <p:nvPr/>
+        </p:nvSpPr>
+        <p:spPr>
+          <a:xfrm rot="5400000">
+            <a:off x="8731668" y="1930634"/>
+            <a:ext cx="494231" cy="119641"/>
+          </a:xfrm>
+          <a:prstGeom prst="flowChartProcess">
+            <a:avLst/>
+          </a:prstGeom>
+        </p:spPr>
+        <p:style>
+          <a:lnRef idx="2">
+            <a:schemeClr val="accent6">
+              <a:shade val="50000"/>
+            </a:schemeClr>
+          </a:lnRef>
+          <a:fillRef idx="1">
+            <a:schemeClr val="accent6"/>
+          </a:fillRef>
+          <a:effectRef idx="0">
+            <a:schemeClr val="accent6"/>
+          </a:effectRef>
+          <a:fontRef idx="minor">
+            <a:schemeClr val="lt1"/>
+          </a:fontRef>
+        </p:style>
+        <p:txBody>
+          <a:bodyPr rtlCol="0" anchor="ctr"/>
+          <a:lstStyle/>
+          <a:p>
+            <a:pPr algn="ctr"/>
+            <a:endParaRPr lang="en-US"/>
+          </a:p>
+        </p:txBody>
+      </p:sp>
+      <p:sp>
+        <p:nvSpPr>
+          <p:cNvPr id="19" name="Flowchart: Process 18">
+            <a:extLst>
+              <a:ext uri="{FF2B5EF4-FFF2-40B4-BE49-F238E27FC236}">
+                <a16:creationId xmlns:a16="http://schemas.microsoft.com/office/drawing/2014/main" id="{D99D1496-503F-4402-81F1-8177DA108B27}"/>
+              </a:ext>
+            </a:extLst>
+          </p:cNvPr>
+          <p:cNvSpPr/>
+          <p:nvPr/>
+        </p:nvSpPr>
+        <p:spPr>
+          <a:xfrm>
+            <a:off x="6845183" y="2245403"/>
+            <a:ext cx="1170774" cy="1051132"/>
+          </a:xfrm>
+          <a:prstGeom prst="flowChartProcess">
+            <a:avLst/>
+          </a:prstGeom>
+        </p:spPr>
+        <p:style>
+          <a:lnRef idx="2">
+            <a:schemeClr val="accent6">
+              <a:shade val="50000"/>
+            </a:schemeClr>
+          </a:lnRef>
+          <a:fillRef idx="1">
+            <a:schemeClr val="accent6"/>
+          </a:fillRef>
+          <a:effectRef idx="0">
+            <a:schemeClr val="accent6"/>
+          </a:effectRef>
+          <a:fontRef idx="minor">
+            <a:schemeClr val="lt1"/>
+          </a:fontRef>
+        </p:style>
+        <p:txBody>
+          <a:bodyPr rtlCol="0" anchor="ctr"/>
+          <a:lstStyle/>
+          <a:p>
+            <a:pPr algn="ctr"/>
+            <a:r>
+              <a:rPr lang="en-US" dirty="0"/>
+              <a:t>frontend2</a:t>
+            </a:r>
+          </a:p>
+        </p:txBody>
+      </p:sp>
+      <p:sp>
+        <p:nvSpPr>
+          <p:cNvPr id="20" name="Flowchart: Process 19">
+            <a:extLst>
+              <a:ext uri="{FF2B5EF4-FFF2-40B4-BE49-F238E27FC236}">
+                <a16:creationId xmlns:a16="http://schemas.microsoft.com/office/drawing/2014/main" id="{32940FEA-EEDE-4433-B140-B58EB6A0EA22}"/>
+              </a:ext>
+            </a:extLst>
+          </p:cNvPr>
+          <p:cNvSpPr/>
+          <p:nvPr/>
+        </p:nvSpPr>
+        <p:spPr>
+          <a:xfrm>
+            <a:off x="8393397" y="2245403"/>
+            <a:ext cx="1170774" cy="1051132"/>
+          </a:xfrm>
+          <a:prstGeom prst="flowChartProcess">
+            <a:avLst/>
+          </a:prstGeom>
+        </p:spPr>
+        <p:style>
+          <a:lnRef idx="2">
+            <a:schemeClr val="accent6">
+              <a:shade val="50000"/>
+            </a:schemeClr>
+          </a:lnRef>
+          <a:fillRef idx="1">
+            <a:schemeClr val="accent6"/>
+          </a:fillRef>
+          <a:effectRef idx="0">
+            <a:schemeClr val="accent6"/>
+          </a:effectRef>
+          <a:fontRef idx="minor">
+            <a:schemeClr val="lt1"/>
+          </a:fontRef>
+        </p:style>
+        <p:txBody>
+          <a:bodyPr rtlCol="0" anchor="ctr"/>
+          <a:lstStyle/>
+          <a:p>
+            <a:pPr algn="ctr"/>
+            <a:r>
+              <a:rPr lang="en-US" dirty="0"/>
+              <a:t>middle2</a:t>
+            </a:r>
+          </a:p>
+        </p:txBody>
+      </p:sp>
+      <p:sp>
+        <p:nvSpPr>
+          <p:cNvPr id="21" name="Flowchart: Process 20">
+            <a:extLst>
+              <a:ext uri="{FF2B5EF4-FFF2-40B4-BE49-F238E27FC236}">
+                <a16:creationId xmlns:a16="http://schemas.microsoft.com/office/drawing/2014/main" id="{D0BBE2B5-2170-4906-BBC1-549593EB87E1}"/>
+              </a:ext>
+            </a:extLst>
+          </p:cNvPr>
+          <p:cNvSpPr/>
+          <p:nvPr/>
+        </p:nvSpPr>
+        <p:spPr>
+          <a:xfrm>
+            <a:off x="9941609" y="2253236"/>
+            <a:ext cx="1170774" cy="1051132"/>
+          </a:xfrm>
+          <a:prstGeom prst="flowChartProcess">
+            <a:avLst/>
+          </a:prstGeom>
+        </p:spPr>
+        <p:style>
+          <a:lnRef idx="2">
+            <a:schemeClr val="accent6">
+              <a:shade val="50000"/>
+            </a:schemeClr>
+          </a:lnRef>
+          <a:fillRef idx="1">
+            <a:schemeClr val="accent6"/>
+          </a:fillRef>
+          <a:effectRef idx="0">
+            <a:schemeClr val="accent6"/>
+          </a:effectRef>
+          <a:fontRef idx="minor">
+            <a:schemeClr val="lt1"/>
+          </a:fontRef>
+        </p:style>
+        <p:txBody>
+          <a:bodyPr rtlCol="0" anchor="ctr"/>
+          <a:lstStyle/>
+          <a:p>
+            <a:pPr algn="ctr"/>
+            <a:r>
+              <a:rPr lang="en-US" dirty="0"/>
+              <a:t>backend2</a:t>
+            </a:r>
+          </a:p>
+        </p:txBody>
+      </p:sp>
+      <p:sp>
+        <p:nvSpPr>
+          <p:cNvPr id="22" name="TextBox 21">
+            <a:extLst>
+              <a:ext uri="{FF2B5EF4-FFF2-40B4-BE49-F238E27FC236}">
+                <a16:creationId xmlns:a16="http://schemas.microsoft.com/office/drawing/2014/main" id="{78CBF6C9-F7C1-4356-90D5-92B6679B506F}"/>
+              </a:ext>
+            </a:extLst>
+          </p:cNvPr>
+          <p:cNvSpPr txBox="1"/>
+          <p:nvPr/>
+        </p:nvSpPr>
+        <p:spPr>
+          <a:xfrm>
+            <a:off x="9759303" y="1238424"/>
+            <a:ext cx="2005412" cy="369332"/>
+          </a:xfrm>
+          <a:prstGeom prst="rect">
+            <a:avLst/>
+          </a:prstGeom>
+          <a:noFill/>
+        </p:spPr>
+        <p:txBody>
+          <a:bodyPr wrap="square" rtlCol="0">
+            <a:spAutoFit/>
+          </a:bodyPr>
+          <a:lstStyle/>
+          <a:p>
+            <a:r>
+              <a:rPr lang="en-US" dirty="0"/>
+              <a:t>group2_net</a:t>
+            </a:r>
+          </a:p>
+        </p:txBody>
+      </p:sp>
+      <p:sp>
+        <p:nvSpPr>
+          <p:cNvPr id="23" name="TextBox 22">
+            <a:extLst>
+              <a:ext uri="{FF2B5EF4-FFF2-40B4-BE49-F238E27FC236}">
+                <a16:creationId xmlns:a16="http://schemas.microsoft.com/office/drawing/2014/main" id="{D98FD488-8DBB-4426-856F-226C2B3FCEB7}"/>
+              </a:ext>
+            </a:extLst>
+          </p:cNvPr>
+          <p:cNvSpPr txBox="1"/>
+          <p:nvPr/>
+        </p:nvSpPr>
+        <p:spPr>
+          <a:xfrm>
+            <a:off x="6845183" y="3419275"/>
+            <a:ext cx="5495192" cy="1200329"/>
+          </a:xfrm>
+          <a:prstGeom prst="rect">
+            <a:avLst/>
+          </a:prstGeom>
+          <a:noFill/>
+        </p:spPr>
+        <p:txBody>
+          <a:bodyPr wrap="square" rtlCol="0">
+            <a:spAutoFit/>
+          </a:bodyPr>
+          <a:lstStyle/>
+          <a:p>
+            <a:r>
+              <a:rPr lang="en-US" dirty="0"/>
+              <a:t>docker stack deploy --compose-file seg6.yml </a:t>
+            </a:r>
+            <a:r>
+              <a:rPr lang="en-US" dirty="0" err="1"/>
+              <a:t>jon</a:t>
+            </a:r>
+            <a:endParaRPr lang="en-US" dirty="0"/>
+          </a:p>
+          <a:p>
+            <a:r>
+              <a:rPr lang="en-US" dirty="0"/>
+              <a:t>docker network ls</a:t>
+            </a:r>
+          </a:p>
+          <a:p>
+            <a:r>
+              <a:rPr lang="en-US" dirty="0"/>
+              <a:t>docker stack </a:t>
+            </a:r>
+            <a:r>
+              <a:rPr lang="en-US" dirty="0" err="1"/>
+              <a:t>ps</a:t>
+            </a:r>
+            <a:r>
+              <a:rPr lang="en-US" dirty="0"/>
+              <a:t> </a:t>
+            </a:r>
+            <a:r>
+              <a:rPr lang="en-US" dirty="0" err="1"/>
+              <a:t>jon</a:t>
+            </a:r>
+            <a:endParaRPr lang="en-US" dirty="0"/>
+          </a:p>
+          <a:p>
+            <a:r>
+              <a:rPr lang="en-US" dirty="0"/>
+              <a:t>docker exec –it jon_frontend1…. /bin/</a:t>
+            </a:r>
+            <a:r>
+              <a:rPr lang="en-US" dirty="0" err="1"/>
+              <a:t>sh</a:t>
+            </a:r>
+            <a:endParaRPr lang="en-US" dirty="0"/>
+          </a:p>
+        </p:txBody>
+      </p:sp>
+    </p:spTree>
+    <p:extLst>
+      <p:ext uri="{BB962C8B-B14F-4D97-AF65-F5344CB8AC3E}">
+        <p14:creationId xmlns:p14="http://schemas.microsoft.com/office/powerpoint/2010/main" val="3104501069"/>
+      </p:ext>
+    </p:extLst>
+  </p:cSld>
+  <p:clrMapOvr>
+    <a:masterClrMapping/>
+  </p:clrMapOvr>
+</p:sld>
+</file>
+
 <file path=ppt/slides/slide3.xml><?xml version="1.0" encoding="utf-8"?>
 <p:sld xmlns:a="http://schemas.openxmlformats.org/drawingml/2006/main" xmlns:r="http://schemas.openxmlformats.org/officeDocument/2006/relationships" xmlns:p="http://schemas.openxmlformats.org/presentationml/2006/main">
   <p:cSld>
@@ -12332,7 +13279,7 @@
                 <a16:creationId xmlns:a16="http://schemas.microsoft.com/office/drawing/2014/main" id="{E20EB187-900F-4AF5-813B-101456D9FD39}"/>
               </a:ext>
               <a:ext uri="{C183D7F6-B498-43B3-948B-1728B52AA6E4}">
-                <adec:decorative xmlns="" xmlns:adec="http://schemas.microsoft.com/office/drawing/2017/decorative" val="1"/>
+                <adec:decorative xmlns:adec="http://schemas.microsoft.com/office/drawing/2017/decorative" val="1"/>
               </a:ext>
             </a:extLst>
           </p:cNvPr>
@@ -12554,7 +13501,7 @@
                 <a16:creationId xmlns:a16="http://schemas.microsoft.com/office/drawing/2014/main" id="{624D17C8-E9C2-48A4-AA36-D7048A6CCC41}"/>
               </a:ext>
               <a:ext uri="{C183D7F6-B498-43B3-948B-1728B52AA6E4}">
-                <adec:decorative xmlns="" xmlns:adec="http://schemas.microsoft.com/office/drawing/2017/decorative" val="1"/>
+                <adec:decorative xmlns:adec="http://schemas.microsoft.com/office/drawing/2017/decorative" val="1"/>
               </a:ext>
             </a:extLst>
           </p:cNvPr>
@@ -13000,7 +13947,7 @@
                 <a16:creationId xmlns:a16="http://schemas.microsoft.com/office/drawing/2014/main" id="{559AE206-7EBA-4D33-8BC9-9D8158553F0E}"/>
               </a:ext>
               <a:ext uri="{C183D7F6-B498-43B3-948B-1728B52AA6E4}">
-                <adec:decorative xmlns:adec="http://schemas.microsoft.com/office/drawing/2017/decorative" xmlns="" val="1"/>
+                <adec:decorative xmlns:adec="http://schemas.microsoft.com/office/drawing/2017/decorative" val="1"/>
               </a:ext>
             </a:extLst>
           </p:cNvPr>
@@ -13103,7 +14050,7 @@
                 <a16:creationId xmlns:a16="http://schemas.microsoft.com/office/drawing/2014/main" id="{6437D937-A7F1-4011-92B4-328E5BE1B166}"/>
               </a:ext>
               <a:ext uri="{C183D7F6-B498-43B3-948B-1728B52AA6E4}">
-                <adec:decorative xmlns:adec="http://schemas.microsoft.com/office/drawing/2017/decorative" xmlns="" val="1"/>
+                <adec:decorative xmlns:adec="http://schemas.microsoft.com/office/drawing/2017/decorative" val="1"/>
               </a:ext>
             </a:extLst>
           </p:cNvPr>
@@ -13166,7 +14113,7 @@
                 <a16:creationId xmlns:a16="http://schemas.microsoft.com/office/drawing/2014/main" id="{B672F332-AF08-46C6-94F0-77684310D7B7}"/>
               </a:ext>
               <a:ext uri="{C183D7F6-B498-43B3-948B-1728B52AA6E4}">
-                <adec:decorative xmlns:adec="http://schemas.microsoft.com/office/drawing/2017/decorative" xmlns="" val="1"/>
+                <adec:decorative xmlns:adec="http://schemas.microsoft.com/office/drawing/2017/decorative" val="1"/>
               </a:ext>
             </a:extLst>
           </p:cNvPr>
@@ -13229,7 +14176,7 @@
                 <a16:creationId xmlns:a16="http://schemas.microsoft.com/office/drawing/2014/main" id="{34244EF8-D73A-40E1-BE73-D46E6B4B04ED}"/>
               </a:ext>
               <a:ext uri="{C183D7F6-B498-43B3-948B-1728B52AA6E4}">
-                <adec:decorative xmlns:adec="http://schemas.microsoft.com/office/drawing/2017/decorative" xmlns="" val="1"/>
+                <adec:decorative xmlns:adec="http://schemas.microsoft.com/office/drawing/2017/decorative" val="1"/>
               </a:ext>
             </a:extLst>
           </p:cNvPr>
@@ -13402,7 +14349,7 @@
                 <a16:creationId xmlns:a16="http://schemas.microsoft.com/office/drawing/2014/main" id="{9E8E38ED-369A-44C2-B635-0BED0E48A6E8}"/>
               </a:ext>
               <a:ext uri="{C183D7F6-B498-43B3-948B-1728B52AA6E4}">
-                <adec:decorative xmlns:adec="http://schemas.microsoft.com/office/drawing/2017/decorative" xmlns="" val="1"/>
+                <adec:decorative xmlns:adec="http://schemas.microsoft.com/office/drawing/2017/decorative" val="1"/>
               </a:ext>
             </a:extLst>
           </p:cNvPr>

</xml_diff>